<commit_message>
Add github link in the presentation
</commit_message>
<xml_diff>
--- a/Presentation/Home Credit Default Risk.pptx
+++ b/Presentation/Home Credit Default Risk.pptx
@@ -17595,11 +17595,7 @@
             </a:pPr>
             <a:r>
               <a:rPr lang="en" dirty="0" smtClean="0"/>
-              <a:t>HOME</a:t>
-            </a:r>
-            <a:r>
-              <a:rPr lang="en" dirty="0" smtClean="0"/>
-              <a:t> </a:t>
+              <a:t>HOME </a:t>
             </a:r>
             <a:r>
               <a:rPr lang="en" dirty="0" smtClean="0">
@@ -20446,11 +20442,6 @@
               </a:rPr>
               <a:t>If the model has predicted the client will repay the loan but actually he has defaulted</a:t>
             </a:r>
-            <a:endParaRPr lang="en-US" sz="1100" dirty="0">
-              <a:solidFill>
-                <a:schemeClr val="bg1"/>
-              </a:solidFill>
-            </a:endParaRPr>
           </a:p>
         </p:txBody>
       </p:sp>
@@ -20484,11 +20475,6 @@
               </a:rPr>
               <a:t>If the model has predicted the client will default but he can actually pay the loan back deserving candidate not getting a loan, bank loss in return interest</a:t>
             </a:r>
-            <a:endParaRPr lang="en-US" sz="1100" dirty="0">
-              <a:solidFill>
-                <a:schemeClr val="bg1"/>
-              </a:solidFill>
-            </a:endParaRPr>
           </a:p>
         </p:txBody>
       </p:sp>
@@ -20788,7 +20774,7 @@
         </p:nvSpPr>
         <p:spPr>
           <a:xfrm>
-            <a:off x="2307882" y="3002386"/>
+            <a:off x="2133600" y="2571750"/>
             <a:ext cx="104086" cy="104322"/>
           </a:xfrm>
           <a:custGeom>
@@ -21991,6 +21977,77 @@
           </a:prstGeom>
         </p:spPr>
       </p:pic>
+      <p:sp>
+        <p:nvSpPr>
+          <p:cNvPr id="2" name="TextBox 1"/>
+          <p:cNvSpPr txBox="1"/>
+          <p:nvPr/>
+        </p:nvSpPr>
+        <p:spPr>
+          <a:xfrm>
+            <a:off x="1917281" y="2851952"/>
+            <a:ext cx="6064531" cy="523220"/>
+          </a:xfrm>
+          <a:prstGeom prst="rect">
+            <a:avLst/>
+          </a:prstGeom>
+          <a:noFill/>
+        </p:spPr>
+        <p:txBody>
+          <a:bodyPr wrap="square" rtlCol="0">
+            <a:spAutoFit/>
+          </a:bodyPr>
+          <a:lstStyle/>
+          <a:p>
+            <a:r>
+              <a:rPr lang="en-US" dirty="0" err="1" smtClean="0">
+                <a:solidFill>
+                  <a:schemeClr val="bg1"/>
+                </a:solidFill>
+              </a:rPr>
+              <a:t>Github</a:t>
+            </a:r>
+            <a:r>
+              <a:rPr lang="en-US" dirty="0">
+                <a:solidFill>
+                  <a:schemeClr val="bg1"/>
+                </a:solidFill>
+              </a:rPr>
+              <a:t> repository: </a:t>
+            </a:r>
+            <a:r>
+              <a:rPr lang="en-US" dirty="0">
+                <a:solidFill>
+                  <a:schemeClr val="bg1"/>
+                </a:solidFill>
+                <a:hlinkClick r:id="rId4"/>
+              </a:rPr>
+              <a:t>https://</a:t>
+            </a:r>
+            <a:r>
+              <a:rPr lang="en-US" dirty="0" smtClean="0">
+                <a:solidFill>
+                  <a:schemeClr val="bg1"/>
+                </a:solidFill>
+                <a:hlinkClick r:id="rId4"/>
+              </a:rPr>
+              <a:t>github.com/HebaAladdin/Kaggle-home-credit-risk</a:t>
+            </a:r>
+            <a:endParaRPr lang="en-US" dirty="0" smtClean="0">
+              <a:solidFill>
+                <a:schemeClr val="bg1"/>
+              </a:solidFill>
+            </a:endParaRPr>
+          </a:p>
+          <a:p>
+            <a:endParaRPr lang="en-US" dirty="0">
+              <a:solidFill>
+                <a:schemeClr val="bg1"/>
+              </a:solidFill>
+            </a:endParaRPr>
+          </a:p>
+        </p:txBody>
+      </p:sp>
     </p:spTree>
     <p:extLst>
       <p:ext uri="{BB962C8B-B14F-4D97-AF65-F5344CB8AC3E}">
@@ -22146,11 +22203,7 @@
             </a:pPr>
             <a:r>
               <a:rPr lang="en" dirty="0" smtClean="0"/>
-              <a:t>Value propasition</a:t>
-            </a:r>
-            <a:r>
-              <a:rPr lang="en" dirty="0" smtClean="0"/>
-              <a:t>.</a:t>
+              <a:t>Value propasition.</a:t>
             </a:r>
             <a:endParaRPr dirty="0"/>
           </a:p>
@@ -22291,10 +22344,7 @@
             <a:endParaRPr dirty="0"/>
           </a:p>
           <a:p>
-            <a:pPr marL="0" lvl="0" indent="0" algn="l" rtl="0">
-              <a:lnSpc>
-                <a:spcPct val="100000"/>
-              </a:lnSpc>
+            <a:pPr marL="0" indent="0">
               <a:spcBef>
                 <a:spcPts val="1600"/>
               </a:spcBef>
@@ -22303,7 +22353,57 @@
               </a:spcAft>
               <a:buNone/>
             </a:pPr>
-            <a:endParaRPr dirty="0"/>
+            <a:r>
+              <a:rPr lang="en-US" dirty="0" err="1">
+                <a:solidFill>
+                  <a:schemeClr val="bg1"/>
+                </a:solidFill>
+              </a:rPr>
+              <a:t>Github</a:t>
+            </a:r>
+            <a:r>
+              <a:rPr lang="en-US" dirty="0">
+                <a:solidFill>
+                  <a:schemeClr val="bg1"/>
+                </a:solidFill>
+              </a:rPr>
+              <a:t> repository: </a:t>
+            </a:r>
+            <a:r>
+              <a:rPr lang="en-US" dirty="0">
+                <a:solidFill>
+                  <a:schemeClr val="bg1"/>
+                </a:solidFill>
+                <a:hlinkClick r:id="rId3"/>
+              </a:rPr>
+              <a:t>https://</a:t>
+            </a:r>
+            <a:r>
+              <a:rPr lang="en-US" dirty="0" smtClean="0">
+                <a:solidFill>
+                  <a:schemeClr val="bg1"/>
+                </a:solidFill>
+                <a:hlinkClick r:id="rId3"/>
+              </a:rPr>
+              <a:t>github.com/HebaAladdin/Kaggle-home-credit-risk</a:t>
+            </a:r>
+            <a:endParaRPr lang="en-US" dirty="0"/>
+          </a:p>
+          <a:p>
+            <a:pPr marL="0" indent="0">
+              <a:spcBef>
+                <a:spcPts val="1600"/>
+              </a:spcBef>
+              <a:spcAft>
+                <a:spcPts val="1600"/>
+              </a:spcAft>
+              <a:buNone/>
+            </a:pPr>
+            <a:endParaRPr lang="en-US" dirty="0">
+              <a:solidFill>
+                <a:schemeClr val="bg1"/>
+              </a:solidFill>
+            </a:endParaRPr>
           </a:p>
         </p:txBody>
       </p:sp>
@@ -34545,19 +34645,7 @@
                 <a:cs typeface="Share Tech"/>
                 <a:sym typeface="Share Tech"/>
               </a:rPr>
-              <a:t>66</a:t>
-            </a:r>
-            <a:r>
-              <a:rPr lang="en" sz="2000" dirty="0" smtClean="0">
-                <a:solidFill>
-                  <a:schemeClr val="accent3"/>
-                </a:solidFill>
-                <a:latin typeface="Share Tech"/>
-                <a:ea typeface="Share Tech"/>
-                <a:cs typeface="Share Tech"/>
-                <a:sym typeface="Share Tech"/>
-              </a:rPr>
-              <a:t>%</a:t>
+              <a:t>66%</a:t>
             </a:r>
             <a:endParaRPr sz="2000" dirty="0">
               <a:solidFill>
@@ -34703,19 +34791,7 @@
                 <a:cs typeface="Share Tech"/>
                 <a:sym typeface="Share Tech"/>
               </a:rPr>
-              <a:t>34</a:t>
-            </a:r>
-            <a:r>
-              <a:rPr lang="en" sz="2000" dirty="0" smtClean="0">
-                <a:solidFill>
-                  <a:schemeClr val="accent2"/>
-                </a:solidFill>
-                <a:latin typeface="Share Tech"/>
-                <a:ea typeface="Share Tech"/>
-                <a:cs typeface="Share Tech"/>
-                <a:sym typeface="Share Tech"/>
-              </a:rPr>
-              <a:t>%</a:t>
+              <a:t>34%</a:t>
             </a:r>
             <a:endParaRPr sz="2000" dirty="0">
               <a:solidFill>
@@ -37024,19 +37100,7 @@
                 <a:cs typeface="Share Tech"/>
                 <a:sym typeface="Share Tech"/>
               </a:rPr>
-              <a:t>10</a:t>
-            </a:r>
-            <a:r>
-              <a:rPr lang="en" sz="2400" dirty="0" smtClean="0">
-                <a:solidFill>
-                  <a:schemeClr val="lt1"/>
-                </a:solidFill>
-                <a:latin typeface="Share Tech"/>
-                <a:ea typeface="Share Tech"/>
-                <a:cs typeface="Share Tech"/>
-                <a:sym typeface="Share Tech"/>
-              </a:rPr>
-              <a:t>%</a:t>
+              <a:t>10%</a:t>
             </a:r>
             <a:endParaRPr sz="2400" dirty="0">
               <a:solidFill>
@@ -42385,12 +42449,6 @@
               </a:rPr>
               <a:t>forest</a:t>
             </a:r>
-            <a:endParaRPr lang="en" sz="1200" dirty="0">
-              <a:latin typeface="Share Tech"/>
-              <a:ea typeface="Share Tech"/>
-              <a:cs typeface="Share Tech"/>
-              <a:sym typeface="Share Tech"/>
-            </a:endParaRPr>
           </a:p>
           <a:p>
             <a:pPr marL="0" indent="0">

</xml_diff>